<commit_message>
Add youtube posting link
</commit_message>
<xml_diff>
--- a/세미프로젝트 결과보고서_최인규.pptx
+++ b/세미프로젝트 결과보고서_최인규.pptx
@@ -24,13 +24,13 @@
       <p:regular r:id="rId10"/>
     </p:embeddedFont>
     <p:embeddedFont>
-      <p:font typeface="뫼비우스 Regular" panose="02000700060000000000" pitchFamily="2" charset="-127"/>
+      <p:font typeface="맑은 고딕" panose="020B0503020000020004" pitchFamily="50" charset="-127"/>
       <p:regular r:id="rId11"/>
+      <p:bold r:id="rId12"/>
     </p:embeddedFont>
     <p:embeddedFont>
-      <p:font typeface="맑은 고딕" panose="020B0503020000020004" pitchFamily="50" charset="-127"/>
-      <p:regular r:id="rId12"/>
-      <p:bold r:id="rId13"/>
+      <p:font typeface="뫼비우스 Regular" panose="02000700060000000000" pitchFamily="2" charset="-127"/>
+      <p:regular r:id="rId13"/>
     </p:embeddedFont>
   </p:embeddedFontLst>
   <p:defaultTextStyle>
@@ -229,7 +229,7 @@
           <a:p>
             <a:fld id="{7A526692-7D6A-4C7A-8688-57509A65FE3B}" type="datetimeFigureOut">
               <a:rPr lang="ko-KR" altLang="en-US" smtClean="0"/>
-              <a:t>2021-03-19</a:t>
+              <a:t>2021-03-22</a:t>
             </a:fld>
             <a:endParaRPr lang="ko-KR" altLang="en-US"/>
           </a:p>
@@ -848,7 +848,7 @@
           <a:p>
             <a:fld id="{3A302466-FE76-40E8-BE5D-598A609EDD2B}" type="datetimeFigureOut">
               <a:rPr lang="ko-KR" altLang="en-US" smtClean="0"/>
-              <a:t>2021-03-19</a:t>
+              <a:t>2021-03-22</a:t>
             </a:fld>
             <a:endParaRPr lang="ko-KR" altLang="en-US"/>
           </a:p>
@@ -1028,7 +1028,7 @@
           <a:p>
             <a:fld id="{3A302466-FE76-40E8-BE5D-598A609EDD2B}" type="datetimeFigureOut">
               <a:rPr lang="ko-KR" altLang="en-US" smtClean="0"/>
-              <a:t>2021-03-19</a:t>
+              <a:t>2021-03-22</a:t>
             </a:fld>
             <a:endParaRPr lang="ko-KR" altLang="en-US"/>
           </a:p>
@@ -1218,7 +1218,7 @@
           <a:p>
             <a:fld id="{3A302466-FE76-40E8-BE5D-598A609EDD2B}" type="datetimeFigureOut">
               <a:rPr lang="ko-KR" altLang="en-US" smtClean="0"/>
-              <a:t>2021-03-19</a:t>
+              <a:t>2021-03-22</a:t>
             </a:fld>
             <a:endParaRPr lang="ko-KR" altLang="en-US"/>
           </a:p>
@@ -1398,7 +1398,7 @@
           <a:p>
             <a:fld id="{3A302466-FE76-40E8-BE5D-598A609EDD2B}" type="datetimeFigureOut">
               <a:rPr lang="ko-KR" altLang="en-US" smtClean="0"/>
-              <a:t>2021-03-19</a:t>
+              <a:t>2021-03-22</a:t>
             </a:fld>
             <a:endParaRPr lang="ko-KR" altLang="en-US"/>
           </a:p>
@@ -1655,7 +1655,7 @@
           <a:p>
             <a:fld id="{3A302466-FE76-40E8-BE5D-598A609EDD2B}" type="datetimeFigureOut">
               <a:rPr lang="ko-KR" altLang="en-US" smtClean="0"/>
-              <a:t>2021-03-19</a:t>
+              <a:t>2021-03-22</a:t>
             </a:fld>
             <a:endParaRPr lang="ko-KR" altLang="en-US"/>
           </a:p>
@@ -1952,7 +1952,7 @@
           <a:p>
             <a:fld id="{3A302466-FE76-40E8-BE5D-598A609EDD2B}" type="datetimeFigureOut">
               <a:rPr lang="ko-KR" altLang="en-US" smtClean="0"/>
-              <a:t>2021-03-19</a:t>
+              <a:t>2021-03-22</a:t>
             </a:fld>
             <a:endParaRPr lang="ko-KR" altLang="en-US"/>
           </a:p>
@@ -2383,7 +2383,7 @@
           <a:p>
             <a:fld id="{3A302466-FE76-40E8-BE5D-598A609EDD2B}" type="datetimeFigureOut">
               <a:rPr lang="ko-KR" altLang="en-US" smtClean="0"/>
-              <a:t>2021-03-19</a:t>
+              <a:t>2021-03-22</a:t>
             </a:fld>
             <a:endParaRPr lang="ko-KR" altLang="en-US"/>
           </a:p>
@@ -2512,7 +2512,7 @@
           <a:p>
             <a:fld id="{3A302466-FE76-40E8-BE5D-598A609EDD2B}" type="datetimeFigureOut">
               <a:rPr lang="ko-KR" altLang="en-US" smtClean="0"/>
-              <a:t>2021-03-19</a:t>
+              <a:t>2021-03-22</a:t>
             </a:fld>
             <a:endParaRPr lang="ko-KR" altLang="en-US"/>
           </a:p>
@@ -2619,7 +2619,7 @@
           <a:p>
             <a:fld id="{3A302466-FE76-40E8-BE5D-598A609EDD2B}" type="datetimeFigureOut">
               <a:rPr lang="ko-KR" altLang="en-US" smtClean="0"/>
-              <a:t>2021-03-19</a:t>
+              <a:t>2021-03-22</a:t>
             </a:fld>
             <a:endParaRPr lang="ko-KR" altLang="en-US"/>
           </a:p>
@@ -2906,7 +2906,7 @@
           <a:p>
             <a:fld id="{3A302466-FE76-40E8-BE5D-598A609EDD2B}" type="datetimeFigureOut">
               <a:rPr lang="ko-KR" altLang="en-US" smtClean="0"/>
-              <a:t>2021-03-19</a:t>
+              <a:t>2021-03-22</a:t>
             </a:fld>
             <a:endParaRPr lang="ko-KR" altLang="en-US"/>
           </a:p>
@@ -3170,7 +3170,7 @@
           <a:p>
             <a:fld id="{3A302466-FE76-40E8-BE5D-598A609EDD2B}" type="datetimeFigureOut">
               <a:rPr lang="ko-KR" altLang="en-US" smtClean="0"/>
-              <a:t>2021-03-19</a:t>
+              <a:t>2021-03-22</a:t>
             </a:fld>
             <a:endParaRPr lang="ko-KR" altLang="en-US"/>
           </a:p>
@@ -3393,7 +3393,7 @@
           <a:p>
             <a:fld id="{3A302466-FE76-40E8-BE5D-598A609EDD2B}" type="datetimeFigureOut">
               <a:rPr lang="ko-KR" altLang="en-US" smtClean="0"/>
-              <a:t>2021-03-19</a:t>
+              <a:t>2021-03-22</a:t>
             </a:fld>
             <a:endParaRPr lang="ko-KR" altLang="en-US"/>
           </a:p>
@@ -4753,6 +4753,73 @@
               <a:latin typeface="Yoon 윤고딕 520_TT" pitchFamily="18" charset="-127"/>
               <a:ea typeface="Yoon 윤고딕 520_TT" pitchFamily="18" charset="-127"/>
             </a:endParaRPr>
+          </a:p>
+        </p:txBody>
+      </p:sp>
+      <p:sp>
+        <p:nvSpPr>
+          <p:cNvPr id="8" name="TextBox 7">
+            <a:extLst>
+              <a:ext uri="{FF2B5EF4-FFF2-40B4-BE49-F238E27FC236}">
+                <a16:creationId xmlns:a16="http://schemas.microsoft.com/office/drawing/2014/main" id="{793D0A7E-3AC1-4A93-A182-C28C40559E91}"/>
+              </a:ext>
+            </a:extLst>
+          </p:cNvPr>
+          <p:cNvSpPr txBox="1"/>
+          <p:nvPr/>
+        </p:nvSpPr>
+        <p:spPr>
+          <a:xfrm>
+            <a:off x="3152800" y="5953206"/>
+            <a:ext cx="6681890" cy="646331"/>
+          </a:xfrm>
+          <a:prstGeom prst="rect">
+            <a:avLst/>
+          </a:prstGeom>
+          <a:noFill/>
+        </p:spPr>
+        <p:txBody>
+          <a:bodyPr wrap="square">
+            <a:spAutoFit/>
+          </a:bodyPr>
+          <a:lstStyle/>
+          <a:p>
+            <a:pPr algn="r"/>
+            <a:r>
+              <a:rPr lang="en-US" altLang="ko-KR" dirty="0" err="1">
+                <a:hlinkClick r:id="rId2"/>
+              </a:rPr>
+              <a:t>Youtube</a:t>
+            </a:r>
+            <a:r>
+              <a:rPr lang="en-US" altLang="ko-KR" dirty="0">
+                <a:hlinkClick r:id="rId2"/>
+              </a:rPr>
+              <a:t> </a:t>
+            </a:r>
+            <a:r>
+              <a:rPr lang="ko-KR" altLang="en-US" dirty="0">
+                <a:hlinkClick r:id="rId2"/>
+              </a:rPr>
+              <a:t>링크</a:t>
+            </a:r>
+            <a:endParaRPr lang="en-US" altLang="ko-KR" dirty="0"/>
+          </a:p>
+          <a:p>
+            <a:pPr algn="r"/>
+            <a:r>
+              <a:rPr lang="ko-KR" altLang="en-US" dirty="0">
+                <a:hlinkClick r:id="rId2"/>
+              </a:rPr>
+              <a:t>h</a:t>
+            </a:r>
+            <a:r>
+              <a:rPr lang="ko-KR" altLang="en-US" dirty="0">
+                <a:hlinkClick r:id="rId2"/>
+              </a:rPr>
+              <a:t>ttps://www.youtube.com/watch?v=B9JPBN6o4SE</a:t>
+            </a:r>
+            <a:endParaRPr lang="ko-KR" altLang="en-US" dirty="0"/>
           </a:p>
         </p:txBody>
       </p:sp>

</xml_diff>